<commit_message>
minor updates from first run
</commit_message>
<xml_diff>
--- a/Powercli/VMwareExplore_2024/PowerCLI_201/CODE1744LV - PowerCLI 201 - From the Shell to Writing Scripts.pptx
+++ b/Powercli/VMwareExplore_2024/PowerCLI_201/CODE1744LV - PowerCLI 201 - From the Shell to Writing Scripts.pptx
@@ -297,7 +297,7 @@
               <a:rPr lang="en-US" smtClean="0">
                 <a:latin typeface="Metropolis" panose="00000500000000000000" pitchFamily="50" charset="0"/>
               </a:rPr>
-              <a:t>8/26/2024</a:t>
+              <a:t>8/28/2024</a:t>
             </a:fld>
             <a:endParaRPr lang="en-US">
               <a:latin typeface="Metropolis" panose="00000500000000000000" pitchFamily="50" charset="0"/>
@@ -475,7 +475,7 @@
             <a:fld id="{3CB6F0DB-E055-41D0-9102-627A646E4242}" type="datetimeFigureOut">
               <a:rPr lang="en-US" smtClean="0"/>
               <a:pPr/>
-              <a:t>8/26/2024</a:t>
+              <a:t>8/28/2024</a:t>
             </a:fld>
             <a:endParaRPr lang="en-US"/>
           </a:p>
@@ -888,7 +888,7 @@
           <a:blip r:embed="rId3">
             <a:extLst>
               <a:ext uri="{96DAC541-7B7A-43D3-8B79-37D633B846F1}">
-                <asvg:svgBlip xmlns:asvg="http://schemas.microsoft.com/office/drawing/2016/SVG/main" xmlns="" r:embed="rId4"/>
+                <asvg:svgBlip xmlns="" xmlns:asvg="http://schemas.microsoft.com/office/drawing/2016/SVG/main" r:embed="rId4"/>
               </a:ext>
             </a:extLst>
           </a:blip>
@@ -1451,7 +1451,7 @@
                 <a16:creationId xmlns:a16="http://schemas.microsoft.com/office/drawing/2014/main" id="{AA1B5F83-A93D-544C-8DB4-B164DBF2F72D}"/>
               </a:ext>
               <a:ext uri="{C183D7F6-B498-43B3-948B-1728B52AA6E4}">
-                <adec:decorative xmlns:adec="http://schemas.microsoft.com/office/drawing/2017/decorative" xmlns="" val="1"/>
+                <adec:decorative xmlns="" xmlns:adec="http://schemas.microsoft.com/office/drawing/2017/decorative" val="1"/>
               </a:ext>
             </a:extLst>
           </p:cNvPr>
@@ -1663,7 +1663,7 @@
                 <a16:creationId xmlns:a16="http://schemas.microsoft.com/office/drawing/2014/main" id="{417D4F8B-2025-D14C-A41E-9C0B401DE6B0}"/>
               </a:ext>
               <a:ext uri="{C183D7F6-B498-43B3-948B-1728B52AA6E4}">
-                <adec:decorative xmlns:adec="http://schemas.microsoft.com/office/drawing/2017/decorative" xmlns="" val="1"/>
+                <adec:decorative xmlns="" xmlns:adec="http://schemas.microsoft.com/office/drawing/2017/decorative" val="1"/>
               </a:ext>
             </a:extLst>
           </p:cNvPr>
@@ -2129,7 +2129,7 @@
                 <a16:creationId xmlns:a16="http://schemas.microsoft.com/office/drawing/2014/main" id="{B164666E-28C9-844E-91D8-ECA2F1E57595}"/>
               </a:ext>
               <a:ext uri="{C183D7F6-B498-43B3-948B-1728B52AA6E4}">
-                <adec:decorative xmlns:adec="http://schemas.microsoft.com/office/drawing/2017/decorative" xmlns="" val="1"/>
+                <adec:decorative xmlns="" xmlns:adec="http://schemas.microsoft.com/office/drawing/2017/decorative" val="1"/>
               </a:ext>
             </a:extLst>
           </p:cNvPr>
@@ -2342,7 +2342,7 @@
                 <a16:creationId xmlns:a16="http://schemas.microsoft.com/office/drawing/2014/main" id="{97B963A1-3810-7A40-8918-6D6D68B4A836}"/>
               </a:ext>
               <a:ext uri="{C183D7F6-B498-43B3-948B-1728B52AA6E4}">
-                <adec:decorative xmlns:adec="http://schemas.microsoft.com/office/drawing/2017/decorative" xmlns="" val="1"/>
+                <adec:decorative xmlns="" xmlns:adec="http://schemas.microsoft.com/office/drawing/2017/decorative" val="1"/>
               </a:ext>
             </a:extLst>
           </p:cNvPr>
@@ -2464,7 +2464,7 @@
                 <a16:creationId xmlns:a16="http://schemas.microsoft.com/office/drawing/2014/main" id="{E17DA4B3-27AC-8A64-FD5E-59AEAE0D8559}"/>
               </a:ext>
               <a:ext uri="{C183D7F6-B498-43B3-948B-1728B52AA6E4}">
-                <adec:decorative xmlns:adec="http://schemas.microsoft.com/office/drawing/2017/decorative" xmlns="" val="1"/>
+                <adec:decorative xmlns="" xmlns:adec="http://schemas.microsoft.com/office/drawing/2017/decorative" val="1"/>
               </a:ext>
             </a:extLst>
           </p:cNvPr>
@@ -2984,7 +2984,7 @@
                 <a16:creationId xmlns:a16="http://schemas.microsoft.com/office/drawing/2014/main" id="{D864AC6E-1611-244C-BA28-696924BAB259}"/>
               </a:ext>
               <a:ext uri="{C183D7F6-B498-43B3-948B-1728B52AA6E4}">
-                <adec:decorative xmlns:adec="http://schemas.microsoft.com/office/drawing/2017/decorative" xmlns="" val="1"/>
+                <adec:decorative xmlns="" xmlns:adec="http://schemas.microsoft.com/office/drawing/2017/decorative" val="1"/>
               </a:ext>
             </a:extLst>
           </p:cNvPr>
@@ -3597,7 +3597,7 @@
                 <a16:creationId xmlns:a16="http://schemas.microsoft.com/office/drawing/2014/main" id="{85B60DB8-F067-969E-72B5-4E90025E5BF8}"/>
               </a:ext>
               <a:ext uri="{C183D7F6-B498-43B3-948B-1728B52AA6E4}">
-                <adec:decorative xmlns:adec="http://schemas.microsoft.com/office/drawing/2017/decorative" xmlns="" val="1"/>
+                <adec:decorative xmlns="" xmlns:adec="http://schemas.microsoft.com/office/drawing/2017/decorative" val="1"/>
               </a:ext>
             </a:extLst>
           </p:cNvPr>
@@ -4100,7 +4100,7 @@
                 <a16:creationId xmlns:a16="http://schemas.microsoft.com/office/drawing/2014/main" id="{F7E2C737-3A4D-924A-88B5-FA4D5C8A07C7}"/>
               </a:ext>
               <a:ext uri="{C183D7F6-B498-43B3-948B-1728B52AA6E4}">
-                <adec:decorative xmlns:adec="http://schemas.microsoft.com/office/drawing/2017/decorative" xmlns="" val="1"/>
+                <adec:decorative xmlns="" xmlns:adec="http://schemas.microsoft.com/office/drawing/2017/decorative" val="1"/>
               </a:ext>
             </a:extLst>
           </p:cNvPr>
@@ -4698,7 +4698,7 @@
                 <a16:creationId xmlns:a16="http://schemas.microsoft.com/office/drawing/2014/main" id="{56D4D92B-574E-4F63-A5BA-8F7282B54C27}"/>
               </a:ext>
               <a:ext uri="{C183D7F6-B498-43B3-948B-1728B52AA6E4}">
-                <adec:decorative xmlns:adec="http://schemas.microsoft.com/office/drawing/2017/decorative" xmlns="" val="1"/>
+                <adec:decorative xmlns="" xmlns:adec="http://schemas.microsoft.com/office/drawing/2017/decorative" val="1"/>
               </a:ext>
             </a:extLst>
           </p:cNvPr>
@@ -4862,7 +4862,7 @@
                 <a16:creationId xmlns:a16="http://schemas.microsoft.com/office/drawing/2014/main" id="{F789B473-DDE6-4450-A111-3761F341AAE3}"/>
               </a:ext>
               <a:ext uri="{C183D7F6-B498-43B3-948B-1728B52AA6E4}">
-                <adec:decorative xmlns:adec="http://schemas.microsoft.com/office/drawing/2017/decorative" xmlns="" val="1"/>
+                <adec:decorative xmlns="" xmlns:adec="http://schemas.microsoft.com/office/drawing/2017/decorative" val="1"/>
               </a:ext>
             </a:extLst>
           </p:cNvPr>
@@ -5372,7 +5372,7 @@
                 <a16:creationId xmlns:a16="http://schemas.microsoft.com/office/drawing/2014/main" id="{14F46384-B6E3-0D43-924E-874DEC2344B1}"/>
               </a:ext>
               <a:ext uri="{C183D7F6-B498-43B3-948B-1728B52AA6E4}">
-                <adec:decorative xmlns:adec="http://schemas.microsoft.com/office/drawing/2017/decorative" xmlns="" val="1"/>
+                <adec:decorative xmlns="" xmlns:adec="http://schemas.microsoft.com/office/drawing/2017/decorative" val="1"/>
               </a:ext>
             </a:extLst>
           </p:cNvPr>
@@ -5519,7 +5519,7 @@
                 <a16:creationId xmlns:a16="http://schemas.microsoft.com/office/drawing/2014/main" id="{33526770-8F35-FB4A-8638-521D0DA87F6C}"/>
               </a:ext>
               <a:ext uri="{C183D7F6-B498-43B3-948B-1728B52AA6E4}">
-                <adec:decorative xmlns:adec="http://schemas.microsoft.com/office/drawing/2017/decorative" xmlns="" val="1"/>
+                <adec:decorative xmlns="" xmlns:adec="http://schemas.microsoft.com/office/drawing/2017/decorative" val="1"/>
               </a:ext>
             </a:extLst>
           </p:cNvPr>
@@ -5666,7 +5666,7 @@
                 <a16:creationId xmlns:a16="http://schemas.microsoft.com/office/drawing/2014/main" id="{73C08A52-2522-8C40-B8B1-C98FEBB888F7}"/>
               </a:ext>
               <a:ext uri="{C183D7F6-B498-43B3-948B-1728B52AA6E4}">
-                <adec:decorative xmlns:adec="http://schemas.microsoft.com/office/drawing/2017/decorative" xmlns="" val="1"/>
+                <adec:decorative xmlns="" xmlns:adec="http://schemas.microsoft.com/office/drawing/2017/decorative" val="1"/>
               </a:ext>
             </a:extLst>
           </p:cNvPr>
@@ -5813,7 +5813,7 @@
                 <a16:creationId xmlns:a16="http://schemas.microsoft.com/office/drawing/2014/main" id="{9B57CCC6-06B1-7342-99B0-BC7C8FBE5E73}"/>
               </a:ext>
               <a:ext uri="{C183D7F6-B498-43B3-948B-1728B52AA6E4}">
-                <adec:decorative xmlns:adec="http://schemas.microsoft.com/office/drawing/2017/decorative" xmlns="" val="1"/>
+                <adec:decorative xmlns="" xmlns:adec="http://schemas.microsoft.com/office/drawing/2017/decorative" val="1"/>
               </a:ext>
             </a:extLst>
           </p:cNvPr>
@@ -5960,7 +5960,7 @@
                 <a16:creationId xmlns:a16="http://schemas.microsoft.com/office/drawing/2014/main" id="{23C87E7C-5ED2-214E-8A38-ED05177A65DC}"/>
               </a:ext>
               <a:ext uri="{C183D7F6-B498-43B3-948B-1728B52AA6E4}">
-                <adec:decorative xmlns:adec="http://schemas.microsoft.com/office/drawing/2017/decorative" xmlns="" val="1"/>
+                <adec:decorative xmlns="" xmlns:adec="http://schemas.microsoft.com/office/drawing/2017/decorative" val="1"/>
               </a:ext>
             </a:extLst>
           </p:cNvPr>
@@ -6729,7 +6729,7 @@
                 <a16:creationId xmlns:a16="http://schemas.microsoft.com/office/drawing/2014/main" id="{5CABBF0D-1BD1-F9E7-64FF-6B8D87E611B7}"/>
               </a:ext>
               <a:ext uri="{C183D7F6-B498-43B3-948B-1728B52AA6E4}">
-                <adec:decorative xmlns:adec="http://schemas.microsoft.com/office/drawing/2017/decorative" xmlns="" val="1"/>
+                <adec:decorative xmlns="" xmlns:adec="http://schemas.microsoft.com/office/drawing/2017/decorative" val="1"/>
               </a:ext>
             </a:extLst>
           </p:cNvPr>
@@ -7189,7 +7189,7 @@
                 <a16:creationId xmlns:a16="http://schemas.microsoft.com/office/drawing/2014/main" id="{B1C210DC-5DBB-4F0D-875F-CD8AAAB938CE}"/>
               </a:ext>
               <a:ext uri="{C183D7F6-B498-43B3-948B-1728B52AA6E4}">
-                <adec:decorative xmlns:adec="http://schemas.microsoft.com/office/drawing/2017/decorative" xmlns="" val="1"/>
+                <adec:decorative xmlns="" xmlns:adec="http://schemas.microsoft.com/office/drawing/2017/decorative" val="1"/>
               </a:ext>
             </a:extLst>
           </p:cNvPr>
@@ -7388,7 +7388,7 @@
                 <a16:creationId xmlns:a16="http://schemas.microsoft.com/office/drawing/2014/main" id="{6FECF9D0-D7A8-43DD-B38D-E1090C0B322F}"/>
               </a:ext>
               <a:ext uri="{C183D7F6-B498-43B3-948B-1728B52AA6E4}">
-                <adec:decorative xmlns:adec="http://schemas.microsoft.com/office/drawing/2017/decorative" xmlns="" val="1"/>
+                <adec:decorative xmlns="" xmlns:adec="http://schemas.microsoft.com/office/drawing/2017/decorative" val="1"/>
               </a:ext>
             </a:extLst>
           </p:cNvPr>
@@ -7601,7 +7601,7 @@
                 <a16:creationId xmlns:a16="http://schemas.microsoft.com/office/drawing/2014/main" id="{446F04B0-7860-407F-85B7-42E38FAFE34B}"/>
               </a:ext>
               <a:ext uri="{C183D7F6-B498-43B3-948B-1728B52AA6E4}">
-                <adec:decorative xmlns:adec="http://schemas.microsoft.com/office/drawing/2017/decorative" xmlns="" val="1"/>
+                <adec:decorative xmlns="" xmlns:adec="http://schemas.microsoft.com/office/drawing/2017/decorative" val="1"/>
               </a:ext>
             </a:extLst>
           </p:cNvPr>
@@ -8028,7 +8028,7 @@
                 <a16:creationId xmlns:a16="http://schemas.microsoft.com/office/drawing/2014/main" id="{085441A7-EBA5-4ABB-8D29-CE4338F0F9B5}"/>
               </a:ext>
               <a:ext uri="{C183D7F6-B498-43B3-948B-1728B52AA6E4}">
-                <adec:decorative xmlns:adec="http://schemas.microsoft.com/office/drawing/2017/decorative" xmlns="" val="1"/>
+                <adec:decorative xmlns="" xmlns:adec="http://schemas.microsoft.com/office/drawing/2017/decorative" val="1"/>
               </a:ext>
             </a:extLst>
           </p:cNvPr>
@@ -8245,7 +8245,7 @@
                 <a16:creationId xmlns:a16="http://schemas.microsoft.com/office/drawing/2014/main" id="{45D908EF-1F96-4808-A8DB-F55AB9E8E436}"/>
               </a:ext>
               <a:ext uri="{C183D7F6-B498-43B3-948B-1728B52AA6E4}">
-                <adec:decorative xmlns:adec="http://schemas.microsoft.com/office/drawing/2017/decorative" xmlns="" val="1"/>
+                <adec:decorative xmlns="" xmlns:adec="http://schemas.microsoft.com/office/drawing/2017/decorative" val="1"/>
               </a:ext>
             </a:extLst>
           </p:cNvPr>
@@ -8458,7 +8458,7 @@
                 <a16:creationId xmlns:a16="http://schemas.microsoft.com/office/drawing/2014/main" id="{5670C03F-6336-45E3-A9F4-0CD130D80D1B}"/>
               </a:ext>
               <a:ext uri="{C183D7F6-B498-43B3-948B-1728B52AA6E4}">
-                <adec:decorative xmlns:adec="http://schemas.microsoft.com/office/drawing/2017/decorative" xmlns="" val="1"/>
+                <adec:decorative xmlns="" xmlns:adec="http://schemas.microsoft.com/office/drawing/2017/decorative" val="1"/>
               </a:ext>
             </a:extLst>
           </p:cNvPr>
@@ -8671,7 +8671,7 @@
                 <a16:creationId xmlns:a16="http://schemas.microsoft.com/office/drawing/2014/main" id="{3019BB56-AE7C-42CA-A8FF-432F4F176B8B}"/>
               </a:ext>
               <a:ext uri="{C183D7F6-B498-43B3-948B-1728B52AA6E4}">
-                <adec:decorative xmlns:adec="http://schemas.microsoft.com/office/drawing/2017/decorative" xmlns="" val="1"/>
+                <adec:decorative xmlns="" xmlns:adec="http://schemas.microsoft.com/office/drawing/2017/decorative" val="1"/>
               </a:ext>
             </a:extLst>
           </p:cNvPr>
@@ -9098,7 +9098,7 @@
                 <a16:creationId xmlns:a16="http://schemas.microsoft.com/office/drawing/2014/main" id="{A1FDF9D3-5B68-4A75-97BF-2C5113CFAA66}"/>
               </a:ext>
               <a:ext uri="{C183D7F6-B498-43B3-948B-1728B52AA6E4}">
-                <adec:decorative xmlns:adec="http://schemas.microsoft.com/office/drawing/2017/decorative" xmlns="" val="1"/>
+                <adec:decorative xmlns="" xmlns:adec="http://schemas.microsoft.com/office/drawing/2017/decorative" val="1"/>
               </a:ext>
             </a:extLst>
           </p:cNvPr>
@@ -9297,7 +9297,7 @@
                 <a16:creationId xmlns:a16="http://schemas.microsoft.com/office/drawing/2014/main" id="{C551C90A-573F-4E4A-9359-5C7B0F546BF9}"/>
               </a:ext>
               <a:ext uri="{C183D7F6-B498-43B3-948B-1728B52AA6E4}">
-                <adec:decorative xmlns:adec="http://schemas.microsoft.com/office/drawing/2017/decorative" xmlns="" val="1"/>
+                <adec:decorative xmlns="" xmlns:adec="http://schemas.microsoft.com/office/drawing/2017/decorative" val="1"/>
               </a:ext>
             </a:extLst>
           </p:cNvPr>
@@ -9499,7 +9499,7 @@
                 <a16:creationId xmlns:a16="http://schemas.microsoft.com/office/drawing/2014/main" id="{AF79E162-3D8F-4829-A4AD-02A03597B11A}"/>
               </a:ext>
               <a:ext uri="{C183D7F6-B498-43B3-948B-1728B52AA6E4}">
-                <adec:decorative xmlns:adec="http://schemas.microsoft.com/office/drawing/2017/decorative" xmlns="" val="1"/>
+                <adec:decorative xmlns="" xmlns:adec="http://schemas.microsoft.com/office/drawing/2017/decorative" val="1"/>
               </a:ext>
             </a:extLst>
           </p:cNvPr>
@@ -9712,7 +9712,7 @@
                 <a16:creationId xmlns:a16="http://schemas.microsoft.com/office/drawing/2014/main" id="{026B9B36-08E7-4664-970C-13123F24C793}"/>
               </a:ext>
               <a:ext uri="{C183D7F6-B498-43B3-948B-1728B52AA6E4}">
-                <adec:decorative xmlns:adec="http://schemas.microsoft.com/office/drawing/2017/decorative" xmlns="" val="1"/>
+                <adec:decorative xmlns="" xmlns:adec="http://schemas.microsoft.com/office/drawing/2017/decorative" val="1"/>
               </a:ext>
             </a:extLst>
           </p:cNvPr>
@@ -9929,7 +9929,7 @@
                 <a16:creationId xmlns:a16="http://schemas.microsoft.com/office/drawing/2014/main" id="{7EAB1992-E472-4489-8A4E-A8FE45DE10CF}"/>
               </a:ext>
               <a:ext uri="{C183D7F6-B498-43B3-948B-1728B52AA6E4}">
-                <adec:decorative xmlns:adec="http://schemas.microsoft.com/office/drawing/2017/decorative" xmlns="" val="1"/>
+                <adec:decorative xmlns="" xmlns:adec="http://schemas.microsoft.com/office/drawing/2017/decorative" val="1"/>
               </a:ext>
             </a:extLst>
           </p:cNvPr>
@@ -10503,7 +10503,7 @@
           <a:blip r:embed="rId3">
             <a:extLst>
               <a:ext uri="{96DAC541-7B7A-43D3-8B79-37D633B846F1}">
-                <asvg:svgBlip xmlns:asvg="http://schemas.microsoft.com/office/drawing/2016/SVG/main" xmlns="" r:embed="rId4"/>
+                <asvg:svgBlip xmlns="" xmlns:asvg="http://schemas.microsoft.com/office/drawing/2016/SVG/main" r:embed="rId4"/>
               </a:ext>
             </a:extLst>
           </a:blip>
@@ -10688,7 +10688,7 @@
           <a:blip r:embed="rId3">
             <a:extLst>
               <a:ext uri="{96DAC541-7B7A-43D3-8B79-37D633B846F1}">
-                <asvg:svgBlip xmlns:asvg="http://schemas.microsoft.com/office/drawing/2016/SVG/main" xmlns="" r:embed="rId4"/>
+                <asvg:svgBlip xmlns="" xmlns:asvg="http://schemas.microsoft.com/office/drawing/2016/SVG/main" r:embed="rId4"/>
               </a:ext>
             </a:extLst>
           </a:blip>
@@ -10950,7 +10950,7 @@
           <a:blip r:embed="rId2">
             <a:extLst>
               <a:ext uri="{96DAC541-7B7A-43D3-8B79-37D633B846F1}">
-                <asvg:svgBlip xmlns:asvg="http://schemas.microsoft.com/office/drawing/2016/SVG/main" xmlns="" r:embed="rId3"/>
+                <asvg:svgBlip xmlns="" xmlns:asvg="http://schemas.microsoft.com/office/drawing/2016/SVG/main" r:embed="rId3"/>
               </a:ext>
             </a:extLst>
           </a:blip>
@@ -11203,7 +11203,7 @@
                 <a16:creationId xmlns:a16="http://schemas.microsoft.com/office/drawing/2014/main" id="{B59E37DB-3217-4772-AE8E-E9673A139975}"/>
               </a:ext>
               <a:ext uri="{C183D7F6-B498-43B3-948B-1728B52AA6E4}">
-                <adec:decorative xmlns:adec="http://schemas.microsoft.com/office/drawing/2017/decorative" xmlns="" val="1"/>
+                <adec:decorative xmlns="" xmlns:adec="http://schemas.microsoft.com/office/drawing/2017/decorative" val="1"/>
               </a:ext>
             </a:extLst>
           </p:cNvPr>
@@ -11252,7 +11252,7 @@
                 <a16:creationId xmlns:a16="http://schemas.microsoft.com/office/drawing/2014/main" id="{F0DFE264-D676-EA48-BBA7-F4F0331FA268}"/>
               </a:ext>
               <a:ext uri="{C183D7F6-B498-43B3-948B-1728B52AA6E4}">
-                <adec:decorative xmlns:adec="http://schemas.microsoft.com/office/drawing/2017/decorative" xmlns="" val="1"/>
+                <adec:decorative xmlns="" xmlns:adec="http://schemas.microsoft.com/office/drawing/2017/decorative" val="1"/>
               </a:ext>
             </a:extLst>
           </p:cNvPr>
@@ -11355,7 +11355,7 @@
                 <a16:creationId xmlns:a16="http://schemas.microsoft.com/office/drawing/2014/main" id="{A0BB7D6E-2488-A644-A910-415B17221FBC}"/>
               </a:ext>
               <a:ext uri="{C183D7F6-B498-43B3-948B-1728B52AA6E4}">
-                <adec:decorative xmlns:adec="http://schemas.microsoft.com/office/drawing/2017/decorative" xmlns="" val="1"/>
+                <adec:decorative xmlns="" xmlns:adec="http://schemas.microsoft.com/office/drawing/2017/decorative" val="1"/>
               </a:ext>
             </a:extLst>
           </p:cNvPr>
@@ -16304,7 +16304,7 @@
           <a:blip r:embed="rId2">
             <a:extLst>
               <a:ext uri="{96DAC541-7B7A-43D3-8B79-37D633B846F1}">
-                <asvg:svgBlip xmlns:asvg="http://schemas.microsoft.com/office/drawing/2016/SVG/main" xmlns="" r:embed="rId3"/>
+                <asvg:svgBlip xmlns="" xmlns:asvg="http://schemas.microsoft.com/office/drawing/2016/SVG/main" r:embed="rId3"/>
               </a:ext>
             </a:extLst>
           </a:blip>
@@ -18863,7 +18863,7 @@
           <a:blip r:embed="rId28">
             <a:extLst>
               <a:ext uri="{96DAC541-7B7A-43D3-8B79-37D633B846F1}">
-                <asvg:svgBlip xmlns:asvg="http://schemas.microsoft.com/office/drawing/2016/SVG/main" xmlns="" r:embed="rId29"/>
+                <asvg:svgBlip xmlns="" xmlns:asvg="http://schemas.microsoft.com/office/drawing/2016/SVG/main" r:embed="rId29"/>
               </a:ext>
             </a:extLst>
           </a:blip>
@@ -20971,15 +20971,7 @@
                   <a:schemeClr val="tx2"/>
                 </a:solidFill>
               </a:rPr>
-              <a:t> 301 session</a:t>
-            </a:r>
-            <a:r>
-              <a:rPr lang="en-US" dirty="0" smtClean="0">
-                <a:solidFill>
-                  <a:schemeClr val="tx2"/>
-                </a:solidFill>
-              </a:rPr>
-              <a:t>!</a:t>
+              <a:t> 301 session!</a:t>
             </a:r>
           </a:p>
           <a:p>
@@ -20996,11 +20988,6 @@
               </a:rPr>
               <a:t>Wednesday or Thursday</a:t>
             </a:r>
-            <a:endParaRPr lang="en-US" sz="1800" dirty="0" smtClean="0">
-              <a:solidFill>
-                <a:schemeClr val="tx2"/>
-              </a:solidFill>
-            </a:endParaRPr>
           </a:p>
         </p:txBody>
       </p:sp>
@@ -22132,7 +22119,15 @@
             </a:r>
             <a:r>
               <a:rPr lang="en-US" dirty="0" smtClean="0"/>
-              <a:t>Method“) –and ($_.name –like ‘*s’)}</a:t>
+              <a:t>Method“) –and ($_.name –</a:t>
+            </a:r>
+            <a:r>
+              <a:rPr lang="en-US" smtClean="0"/>
+              <a:t>like </a:t>
+            </a:r>
+            <a:r>
+              <a:rPr lang="en-US" smtClean="0"/>
+              <a:t>‘s*’)}</a:t>
             </a:r>
             <a:endParaRPr lang="en-US" dirty="0"/>
           </a:p>
@@ -24667,8 +24662,8 @@
         </p:nvSpPr>
         <p:spPr>
           <a:xfrm>
-            <a:off x="580291" y="3429000"/>
-            <a:ext cx="11608533" cy="1600200"/>
+            <a:off x="580292" y="3429000"/>
+            <a:ext cx="10108424" cy="1600200"/>
           </a:xfrm>
         </p:spPr>
         <p:txBody>
@@ -24684,17 +24679,30 @@
             <a:endParaRPr lang="en-US" sz="2000" dirty="0"/>
           </a:p>
           <a:p>
-            <a:r>
-              <a:rPr lang="en-US" sz="4400" dirty="0" smtClean="0"/>
-              <a:t>Join the VMware {code} Hackathon tonight!  </a:t>
-            </a:r>
-          </a:p>
-          <a:p>
-            <a:r>
-              <a:rPr lang="en-US" sz="4400" dirty="0" smtClean="0"/>
-              <a:t>7-11pm Hall G</a:t>
-            </a:r>
-            <a:endParaRPr lang="en-US" sz="4400" dirty="0"/>
+            <a:pPr algn="r"/>
+            <a:r>
+              <a:rPr lang="en-US" sz="3200" dirty="0" err="1" smtClean="0"/>
+              <a:t>PowerCLI</a:t>
+            </a:r>
+            <a:r>
+              <a:rPr lang="en-US" sz="3200" dirty="0" smtClean="0"/>
+              <a:t> 301 …</a:t>
+            </a:r>
+          </a:p>
+          <a:p>
+            <a:pPr algn="r"/>
+            <a:r>
+              <a:rPr lang="en-US" sz="3200" dirty="0" smtClean="0"/>
+              <a:t>3pm Today</a:t>
+            </a:r>
+          </a:p>
+          <a:p>
+            <a:pPr algn="r"/>
+            <a:r>
+              <a:rPr lang="en-US" sz="3200" dirty="0" smtClean="0"/>
+              <a:t>9:30 Tomorrow</a:t>
+            </a:r>
+            <a:endParaRPr lang="en-US" sz="3200" dirty="0"/>
           </a:p>
         </p:txBody>
       </p:sp>
@@ -27269,6 +27277,15 @@
 </file>
 
 <file path=customXml/item1.xml><?xml version="1.0" encoding="utf-8"?>
+<?mso-contentType ?>
+<FormTemplates xmlns="http://schemas.microsoft.com/sharepoint/v3/contenttype/forms">
+  <Display>DocumentLibraryForm</Display>
+  <Edit>DocumentLibraryForm</Edit>
+  <New>DocumentLibraryForm</New>
+</FormTemplates>
+</file>
+
+<file path=customXml/item2.xml><?xml version="1.0" encoding="utf-8"?>
 <ct:contentTypeSchema xmlns:ct="http://schemas.microsoft.com/office/2006/metadata/contentType" xmlns:ma="http://schemas.microsoft.com/office/2006/metadata/properties/metaAttributes" ct:_="" ma:_="" ma:contentTypeName="Document" ma:contentTypeID="0x0101008B3F91C0C4ECEE479555FEA4A4EB2B48" ma:contentTypeVersion="15" ma:contentTypeDescription="Create a new document." ma:contentTypeScope="" ma:versionID="c6a87b1e4bc033b72f454e04dac54d88">
   <xsd:schema xmlns:xsd="http://www.w3.org/2001/XMLSchema" xmlns:xs="http://www.w3.org/2001/XMLSchema" xmlns:p="http://schemas.microsoft.com/office/2006/metadata/properties" xmlns:ns2="34d4d772-b3f2-47fc-9a2d-2126f9957ae8" xmlns:ns3="d345b56e-75a0-4ca8-9b4b-110cb999efd5" targetNamespace="http://schemas.microsoft.com/office/2006/metadata/properties" ma:root="true" ma:fieldsID="6eb14a52ad1190b1f78ecaeae027f828" ns2:_="" ns3:_="">
     <xsd:import namespace="34d4d772-b3f2-47fc-9a2d-2126f9957ae8"/>
@@ -27503,15 +27520,6 @@
 </ct:contentTypeSchema>
 </file>
 
-<file path=customXml/item2.xml><?xml version="1.0" encoding="utf-8"?>
-<?mso-contentType ?>
-<FormTemplates xmlns="http://schemas.microsoft.com/sharepoint/v3/contenttype/forms">
-  <Display>DocumentLibraryForm</Display>
-  <Edit>DocumentLibraryForm</Edit>
-  <New>DocumentLibraryForm</New>
-</FormTemplates>
-</file>
-
 <file path=customXml/item3.xml><?xml version="1.0" encoding="utf-8"?>
 <p:properties xmlns:p="http://schemas.microsoft.com/office/2006/metadata/properties" xmlns:xsi="http://www.w3.org/2001/XMLSchema-instance" xmlns:pc="http://schemas.microsoft.com/office/infopath/2007/PartnerControls">
   <documentManagement>
@@ -27536,6 +27544,14 @@
 </file>
 
 <file path=customXml/itemProps1.xml><?xml version="1.0" encoding="utf-8"?>
+<ds:datastoreItem xmlns:ds="http://schemas.openxmlformats.org/officeDocument/2006/customXml" ds:itemID="{BAD99180-4DF7-4231-B572-5E5D5B192DA4}">
+  <ds:schemaRefs>
+    <ds:schemaRef ds:uri="http://schemas.microsoft.com/sharepoint/v3/contenttype/forms"/>
+  </ds:schemaRefs>
+</ds:datastoreItem>
+</file>
+
+<file path=customXml/itemProps2.xml><?xml version="1.0" encoding="utf-8"?>
 <ds:datastoreItem xmlns:ds="http://schemas.openxmlformats.org/officeDocument/2006/customXml" ds:itemID="{28FF4D8F-9B19-4DA8-8A71-562BBA95DCB6}">
   <ds:schemaRefs>
     <ds:schemaRef ds:uri="http://schemas.microsoft.com/office/2006/metadata/contentType"/>
@@ -27550,14 +27566,6 @@
     <ds:schemaRef ds:uri="http://purl.org/dc/elements/1.1/"/>
     <ds:schemaRef ds:uri="http://purl.org/dc/terms/"/>
     <ds:schemaRef ds:uri="http://schemas.microsoft.com/internal/obd"/>
-  </ds:schemaRefs>
-</ds:datastoreItem>
-</file>
-
-<file path=customXml/itemProps2.xml><?xml version="1.0" encoding="utf-8"?>
-<ds:datastoreItem xmlns:ds="http://schemas.openxmlformats.org/officeDocument/2006/customXml" ds:itemID="{BAD99180-4DF7-4231-B572-5E5D5B192DA4}">
-  <ds:schemaRefs>
-    <ds:schemaRef ds:uri="http://schemas.microsoft.com/sharepoint/v3/contenttype/forms"/>
   </ds:schemaRefs>
 </ds:datastoreItem>
 </file>

</xml_diff>